<commit_message>
Small words adjustment in Presentation
</commit_message>
<xml_diff>
--- a/Presentation.pptx
+++ b/Presentation.pptx
@@ -2084,7 +2084,7 @@
         <a:p>
           <a:r>
             <a:rPr lang="en-US" dirty="0"/>
-            <a:t>I’m a rebel</a:t>
+            <a:t>I’m happy</a:t>
           </a:r>
         </a:p>
       </dgm:t>
@@ -2120,7 +2120,7 @@
         <a:p>
           <a:r>
             <a:rPr lang="en-US" dirty="0"/>
-            <a:t>I’m depressed</a:t>
+            <a:t>I’m sad</a:t>
           </a:r>
         </a:p>
       </dgm:t>
@@ -3269,12 +3269,12 @@
         </a:fontRef>
       </dsp:style>
       <dsp:txBody>
-        <a:bodyPr spcFirstLastPara="0" vert="horz" wrap="square" lIns="24130" tIns="24130" rIns="24130" bIns="24130" numCol="1" spcCol="1270" anchor="ctr" anchorCtr="0">
+        <a:bodyPr spcFirstLastPara="0" vert="horz" wrap="square" lIns="25400" tIns="25400" rIns="25400" bIns="25400" numCol="1" spcCol="1270" anchor="ctr" anchorCtr="0">
           <a:noAutofit/>
         </a:bodyPr>
         <a:lstStyle/>
         <a:p>
-          <a:pPr marL="0" lvl="0" indent="0" algn="ctr" defTabSz="844550">
+          <a:pPr marL="0" lvl="0" indent="0" algn="ctr" defTabSz="889000">
             <a:lnSpc>
               <a:spcPct val="90000"/>
             </a:lnSpc>
@@ -3287,7 +3287,7 @@
             <a:buNone/>
           </a:pPr>
           <a:r>
-            <a:rPr lang="en-US" sz="1900" kern="1200" dirty="0"/>
+            <a:rPr lang="en-US" sz="2000" kern="1200" dirty="0"/>
             <a:t>I’m just awesome</a:t>
           </a:r>
         </a:p>
@@ -3347,12 +3347,12 @@
         </a:fontRef>
       </dsp:style>
       <dsp:txBody>
-        <a:bodyPr spcFirstLastPara="0" vert="horz" wrap="square" lIns="24130" tIns="24130" rIns="24130" bIns="24130" numCol="1" spcCol="1270" anchor="ctr" anchorCtr="0">
+        <a:bodyPr spcFirstLastPara="0" vert="horz" wrap="square" lIns="25400" tIns="25400" rIns="25400" bIns="25400" numCol="1" spcCol="1270" anchor="ctr" anchorCtr="0">
           <a:noAutofit/>
         </a:bodyPr>
         <a:lstStyle/>
         <a:p>
-          <a:pPr marL="0" lvl="0" indent="0" algn="ctr" defTabSz="844550">
+          <a:pPr marL="0" lvl="0" indent="0" algn="ctr" defTabSz="889000">
             <a:lnSpc>
               <a:spcPct val="90000"/>
             </a:lnSpc>
@@ -3365,8 +3365,8 @@
             <a:buNone/>
           </a:pPr>
           <a:r>
-            <a:rPr lang="en-US" sz="1900" kern="1200" dirty="0"/>
-            <a:t>I’m a rebel</a:t>
+            <a:rPr lang="en-US" sz="2000" kern="1200" dirty="0"/>
+            <a:t>I’m happy</a:t>
           </a:r>
         </a:p>
       </dsp:txBody>
@@ -3425,12 +3425,12 @@
         </a:fontRef>
       </dsp:style>
       <dsp:txBody>
-        <a:bodyPr spcFirstLastPara="0" vert="horz" wrap="square" lIns="24130" tIns="24130" rIns="24130" bIns="24130" numCol="1" spcCol="1270" anchor="ctr" anchorCtr="0">
+        <a:bodyPr spcFirstLastPara="0" vert="horz" wrap="square" lIns="25400" tIns="25400" rIns="25400" bIns="25400" numCol="1" spcCol="1270" anchor="ctr" anchorCtr="0">
           <a:noAutofit/>
         </a:bodyPr>
         <a:lstStyle/>
         <a:p>
-          <a:pPr marL="0" lvl="0" indent="0" algn="ctr" defTabSz="844550">
+          <a:pPr marL="0" lvl="0" indent="0" algn="ctr" defTabSz="889000">
             <a:lnSpc>
               <a:spcPct val="90000"/>
             </a:lnSpc>
@@ -3443,8 +3443,8 @@
             <a:buNone/>
           </a:pPr>
           <a:r>
-            <a:rPr lang="en-US" sz="1900" kern="1200" dirty="0"/>
-            <a:t>I’m depressed</a:t>
+            <a:rPr lang="en-US" sz="2000" kern="1200" dirty="0"/>
+            <a:t>I’m sad</a:t>
           </a:r>
         </a:p>
       </dsp:txBody>
@@ -3503,12 +3503,12 @@
         </a:fontRef>
       </dsp:style>
       <dsp:txBody>
-        <a:bodyPr spcFirstLastPara="0" vert="horz" wrap="square" lIns="24130" tIns="24130" rIns="24130" bIns="24130" numCol="1" spcCol="1270" anchor="ctr" anchorCtr="0">
+        <a:bodyPr spcFirstLastPara="0" vert="horz" wrap="square" lIns="25400" tIns="25400" rIns="25400" bIns="25400" numCol="1" spcCol="1270" anchor="ctr" anchorCtr="0">
           <a:noAutofit/>
         </a:bodyPr>
         <a:lstStyle/>
         <a:p>
-          <a:pPr marL="0" lvl="0" indent="0" algn="ctr" defTabSz="844550">
+          <a:pPr marL="0" lvl="0" indent="0" algn="ctr" defTabSz="889000">
             <a:lnSpc>
               <a:spcPct val="90000"/>
             </a:lnSpc>
@@ -3521,7 +3521,7 @@
             <a:buNone/>
           </a:pPr>
           <a:r>
-            <a:rPr lang="en-US" sz="1900" kern="1200" dirty="0"/>
+            <a:rPr lang="en-US" sz="2000" kern="1200" dirty="0"/>
             <a:t>I’m shy</a:t>
           </a:r>
         </a:p>
@@ -3581,12 +3581,12 @@
         </a:fontRef>
       </dsp:style>
       <dsp:txBody>
-        <a:bodyPr spcFirstLastPara="0" vert="horz" wrap="square" lIns="24130" tIns="24130" rIns="24130" bIns="24130" numCol="1" spcCol="1270" anchor="ctr" anchorCtr="0">
+        <a:bodyPr spcFirstLastPara="0" vert="horz" wrap="square" lIns="25400" tIns="25400" rIns="25400" bIns="25400" numCol="1" spcCol="1270" anchor="ctr" anchorCtr="0">
           <a:noAutofit/>
         </a:bodyPr>
         <a:lstStyle/>
         <a:p>
-          <a:pPr marL="0" lvl="0" indent="0" algn="ctr" defTabSz="844550">
+          <a:pPr marL="0" lvl="0" indent="0" algn="ctr" defTabSz="889000">
             <a:lnSpc>
               <a:spcPct val="90000"/>
             </a:lnSpc>
@@ -3599,7 +3599,7 @@
             <a:buNone/>
           </a:pPr>
           <a:r>
-            <a:rPr lang="en-US" sz="1900" kern="1200" dirty="0"/>
+            <a:rPr lang="en-US" sz="2000" kern="1200" dirty="0"/>
             <a:t>I love tennis</a:t>
           </a:r>
         </a:p>
@@ -3659,12 +3659,12 @@
         </a:fontRef>
       </dsp:style>
       <dsp:txBody>
-        <a:bodyPr spcFirstLastPara="0" vert="horz" wrap="square" lIns="24130" tIns="24130" rIns="24130" bIns="24130" numCol="1" spcCol="1270" anchor="ctr" anchorCtr="0">
+        <a:bodyPr spcFirstLastPara="0" vert="horz" wrap="square" lIns="25400" tIns="25400" rIns="25400" bIns="25400" numCol="1" spcCol="1270" anchor="ctr" anchorCtr="0">
           <a:noAutofit/>
         </a:bodyPr>
         <a:lstStyle/>
         <a:p>
-          <a:pPr marL="0" lvl="0" indent="0" algn="ctr" defTabSz="844550">
+          <a:pPr marL="0" lvl="0" indent="0" algn="ctr" defTabSz="889000">
             <a:lnSpc>
               <a:spcPct val="90000"/>
             </a:lnSpc>
@@ -3677,7 +3677,7 @@
             <a:buNone/>
           </a:pPr>
           <a:r>
-            <a:rPr lang="en-US" sz="1900" kern="1200" dirty="0"/>
+            <a:rPr lang="en-US" sz="2000" kern="1200" dirty="0"/>
             <a:t>I love chess</a:t>
           </a:r>
         </a:p>
@@ -10356,7 +10356,7 @@
           <p:nvPr>
             <p:extLst>
               <p:ext uri="{D42A27DB-BD31-4B8C-83A1-F6EECF244321}">
-                <p14:modId xmlns:p14="http://schemas.microsoft.com/office/powerpoint/2010/main" val="4036101857"/>
+                <p14:modId xmlns:p14="http://schemas.microsoft.com/office/powerpoint/2010/main" val="2388166349"/>
               </p:ext>
             </p:extLst>
           </p:nvPr>

</xml_diff>